<commit_message>
Update QF604 Econometrics Final v1.6.pptx
</commit_message>
<xml_diff>
--- a/QF604 Econometrics Final v1.6.pptx
+++ b/QF604 Econometrics Final v1.6.pptx
@@ -5,42 +5,44 @@
     <p:sldMasterId id="2147483660" r:id="rId1"/>
   </p:sldMasterIdLst>
   <p:notesMasterIdLst>
-    <p:notesMasterId r:id="rId35"/>
+    <p:notesMasterId r:id="rId37"/>
   </p:notesMasterIdLst>
   <p:sldIdLst>
     <p:sldId id="257" r:id="rId2"/>
-    <p:sldId id="299" r:id="rId3"/>
-    <p:sldId id="301" r:id="rId4"/>
-    <p:sldId id="283" r:id="rId5"/>
-    <p:sldId id="337" r:id="rId6"/>
-    <p:sldId id="302" r:id="rId7"/>
-    <p:sldId id="328" r:id="rId8"/>
-    <p:sldId id="329" r:id="rId9"/>
-    <p:sldId id="330" r:id="rId10"/>
-    <p:sldId id="331" r:id="rId11"/>
-    <p:sldId id="332" r:id="rId12"/>
-    <p:sldId id="338" r:id="rId13"/>
-    <p:sldId id="333" r:id="rId14"/>
-    <p:sldId id="334" r:id="rId15"/>
-    <p:sldId id="336" r:id="rId16"/>
-    <p:sldId id="335" r:id="rId17"/>
-    <p:sldId id="339" r:id="rId18"/>
-    <p:sldId id="340" r:id="rId19"/>
-    <p:sldId id="342" r:id="rId20"/>
-    <p:sldId id="341" r:id="rId21"/>
-    <p:sldId id="343" r:id="rId22"/>
-    <p:sldId id="344" r:id="rId23"/>
-    <p:sldId id="345" r:id="rId24"/>
-    <p:sldId id="346" r:id="rId25"/>
-    <p:sldId id="364" r:id="rId26"/>
-    <p:sldId id="373" r:id="rId27"/>
-    <p:sldId id="350" r:id="rId28"/>
-    <p:sldId id="371" r:id="rId29"/>
-    <p:sldId id="374" r:id="rId30"/>
-    <p:sldId id="375" r:id="rId31"/>
-    <p:sldId id="349" r:id="rId32"/>
-    <p:sldId id="377" r:id="rId33"/>
-    <p:sldId id="376" r:id="rId34"/>
+    <p:sldId id="378" r:id="rId3"/>
+    <p:sldId id="379" r:id="rId4"/>
+    <p:sldId id="299" r:id="rId5"/>
+    <p:sldId id="301" r:id="rId6"/>
+    <p:sldId id="283" r:id="rId7"/>
+    <p:sldId id="337" r:id="rId8"/>
+    <p:sldId id="302" r:id="rId9"/>
+    <p:sldId id="328" r:id="rId10"/>
+    <p:sldId id="329" r:id="rId11"/>
+    <p:sldId id="330" r:id="rId12"/>
+    <p:sldId id="331" r:id="rId13"/>
+    <p:sldId id="332" r:id="rId14"/>
+    <p:sldId id="338" r:id="rId15"/>
+    <p:sldId id="333" r:id="rId16"/>
+    <p:sldId id="334" r:id="rId17"/>
+    <p:sldId id="336" r:id="rId18"/>
+    <p:sldId id="335" r:id="rId19"/>
+    <p:sldId id="339" r:id="rId20"/>
+    <p:sldId id="340" r:id="rId21"/>
+    <p:sldId id="342" r:id="rId22"/>
+    <p:sldId id="341" r:id="rId23"/>
+    <p:sldId id="343" r:id="rId24"/>
+    <p:sldId id="344" r:id="rId25"/>
+    <p:sldId id="345" r:id="rId26"/>
+    <p:sldId id="346" r:id="rId27"/>
+    <p:sldId id="364" r:id="rId28"/>
+    <p:sldId id="373" r:id="rId29"/>
+    <p:sldId id="350" r:id="rId30"/>
+    <p:sldId id="371" r:id="rId31"/>
+    <p:sldId id="374" r:id="rId32"/>
+    <p:sldId id="375" r:id="rId33"/>
+    <p:sldId id="349" r:id="rId34"/>
+    <p:sldId id="377" r:id="rId35"/>
+    <p:sldId id="376" r:id="rId36"/>
   </p:sldIdLst>
   <p:sldSz cx="12192000" cy="6858000"/>
   <p:notesSz cx="6858000" cy="9144000"/>
@@ -3957,6 +3959,263 @@
           <a:lstStyle/>
           <a:p>
             <a:r>
+              <a:rPr lang="en-SG" dirty="0" err="1"/>
+              <a:t>Center</a:t>
+            </a:r>
+            <a:r>
+              <a:rPr lang="en-SG" dirty="0"/>
+              <a:t> for Research in Security Prices (CRSP)</a:t>
+            </a:r>
+          </a:p>
+        </p:txBody>
+      </p:sp>
+      <p:sp>
+        <p:nvSpPr>
+          <p:cNvPr id="3" name="Content Placeholder 2">
+            <a:extLst>
+              <a:ext uri="{FF2B5EF4-FFF2-40B4-BE49-F238E27FC236}">
+                <a16:creationId xmlns:a16="http://schemas.microsoft.com/office/drawing/2014/main" id="{C5A6A21D-90D4-4D3D-A603-476DBD3CBF11}"/>
+              </a:ext>
+            </a:extLst>
+          </p:cNvPr>
+          <p:cNvSpPr>
+            <a:spLocks noGrp="1"/>
+          </p:cNvSpPr>
+          <p:nvPr>
+            <p:ph idx="1"/>
+          </p:nvPr>
+        </p:nvSpPr>
+        <p:spPr/>
+        <p:txBody>
+          <a:bodyPr anchor="ctr">
+            <a:normAutofit/>
+          </a:bodyPr>
+          <a:lstStyle/>
+          <a:p>
+            <a:pPr algn="just"/>
+            <a:r>
+              <a:rPr lang="en-SG" dirty="0"/>
+              <a:t>The </a:t>
+            </a:r>
+            <a:r>
+              <a:rPr lang="en-SG" dirty="0" err="1"/>
+              <a:t>Center</a:t>
+            </a:r>
+            <a:r>
+              <a:rPr lang="en-SG" dirty="0"/>
+              <a:t> for Research in Security Prices (CRSP) provided us with relevant data on:</a:t>
+            </a:r>
+          </a:p>
+          <a:p>
+            <a:pPr lvl="1" algn="just"/>
+            <a:r>
+              <a:rPr lang="en-SG" sz="1800" dirty="0"/>
+              <a:t>Monthly closing price, </a:t>
+            </a:r>
+          </a:p>
+          <a:p>
+            <a:pPr lvl="1" algn="just"/>
+            <a:r>
+              <a:rPr lang="en-SG" sz="1800" dirty="0"/>
+              <a:t>Adjusted returns </a:t>
+            </a:r>
+          </a:p>
+          <a:p>
+            <a:pPr lvl="1" algn="just"/>
+            <a:r>
+              <a:rPr lang="en-SG" sz="1800" dirty="0"/>
+              <a:t>Outstanding number of stocks. </a:t>
+            </a:r>
+          </a:p>
+          <a:p>
+            <a:pPr algn="just"/>
+            <a:r>
+              <a:rPr lang="en-SG" b="1" dirty="0"/>
+              <a:t>PERMCOs and PERMNOs </a:t>
+            </a:r>
+            <a:r>
+              <a:rPr lang="en-SG" dirty="0"/>
+              <a:t>as unique entity and issue-level identifiers when navigating the CRSP database.</a:t>
+            </a:r>
+          </a:p>
+        </p:txBody>
+      </p:sp>
+    </p:spTree>
+    <p:extLst>
+      <p:ext uri="{BB962C8B-B14F-4D97-AF65-F5344CB8AC3E}">
+        <p14:creationId xmlns:p14="http://schemas.microsoft.com/office/powerpoint/2010/main" val="1085148044"/>
+      </p:ext>
+    </p:extLst>
+  </p:cSld>
+  <p:clrMapOvr>
+    <a:masterClrMapping/>
+  </p:clrMapOvr>
+</p:sld>
+</file>
+
+<file path=ppt/slides/slide11.xml><?xml version="1.0" encoding="utf-8"?>
+<p:sld xmlns:a="http://schemas.openxmlformats.org/drawingml/2006/main" xmlns:r="http://schemas.openxmlformats.org/officeDocument/2006/relationships" xmlns:p="http://schemas.openxmlformats.org/presentationml/2006/main">
+  <p:cSld>
+    <p:spTree>
+      <p:nvGrpSpPr>
+        <p:cNvPr id="1" name=""/>
+        <p:cNvGrpSpPr/>
+        <p:nvPr/>
+      </p:nvGrpSpPr>
+      <p:grpSpPr>
+        <a:xfrm>
+          <a:off x="0" y="0"/>
+          <a:ext cx="0" cy="0"/>
+          <a:chOff x="0" y="0"/>
+          <a:chExt cx="0" cy="0"/>
+        </a:xfrm>
+      </p:grpSpPr>
+      <p:sp>
+        <p:nvSpPr>
+          <p:cNvPr id="2" name="Title 1">
+            <a:extLst>
+              <a:ext uri="{FF2B5EF4-FFF2-40B4-BE49-F238E27FC236}">
+                <a16:creationId xmlns:a16="http://schemas.microsoft.com/office/drawing/2014/main" id="{E32021F1-307B-408C-9FCF-6F677B44ECFE}"/>
+              </a:ext>
+            </a:extLst>
+          </p:cNvPr>
+          <p:cNvSpPr>
+            <a:spLocks noGrp="1"/>
+          </p:cNvSpPr>
+          <p:nvPr>
+            <p:ph type="title"/>
+          </p:nvPr>
+        </p:nvSpPr>
+        <p:spPr/>
+        <p:txBody>
+          <a:bodyPr anchor="ctr">
+            <a:normAutofit/>
+          </a:bodyPr>
+          <a:lstStyle/>
+          <a:p>
+            <a:r>
+              <a:rPr lang="en-SG" dirty="0" err="1"/>
+              <a:t>Compustat</a:t>
+            </a:r>
+            <a:r>
+              <a:rPr lang="en-SG" dirty="0"/>
+              <a:t> - Capital IQ</a:t>
+            </a:r>
+          </a:p>
+        </p:txBody>
+      </p:sp>
+      <p:sp>
+        <p:nvSpPr>
+          <p:cNvPr id="3" name="Content Placeholder 2">
+            <a:extLst>
+              <a:ext uri="{FF2B5EF4-FFF2-40B4-BE49-F238E27FC236}">
+                <a16:creationId xmlns:a16="http://schemas.microsoft.com/office/drawing/2014/main" id="{C5A6A21D-90D4-4D3D-A603-476DBD3CBF11}"/>
+              </a:ext>
+            </a:extLst>
+          </p:cNvPr>
+          <p:cNvSpPr>
+            <a:spLocks noGrp="1"/>
+          </p:cNvSpPr>
+          <p:nvPr>
+            <p:ph idx="1"/>
+          </p:nvPr>
+        </p:nvSpPr>
+        <p:spPr/>
+        <p:txBody>
+          <a:bodyPr anchor="ctr">
+            <a:normAutofit/>
+          </a:bodyPr>
+          <a:lstStyle/>
+          <a:p>
+            <a:pPr algn="just"/>
+            <a:r>
+              <a:rPr lang="en-SG" dirty="0" err="1"/>
+              <a:t>Compustat</a:t>
+            </a:r>
+            <a:r>
+              <a:rPr lang="en-SG" dirty="0"/>
+              <a:t> provided us with the relevant fundamentals data (e.g. Net Income, Operating Cash Flow etc) on the relevant constituent stocks of the Dow Jones Utility Average. </a:t>
+            </a:r>
+          </a:p>
+          <a:p>
+            <a:pPr algn="just"/>
+            <a:r>
+              <a:rPr lang="en-SG" dirty="0"/>
+              <a:t>We used </a:t>
+            </a:r>
+            <a:r>
+              <a:rPr lang="en-SG" b="1" dirty="0"/>
+              <a:t>GVKEY</a:t>
+            </a:r>
+            <a:r>
+              <a:rPr lang="en-SG" dirty="0"/>
+              <a:t> as unique entity-level identifiers when navigating the </a:t>
+            </a:r>
+            <a:r>
+              <a:rPr lang="en-SG" dirty="0" err="1"/>
+              <a:t>Compustat</a:t>
+            </a:r>
+            <a:r>
+              <a:rPr lang="en-SG" dirty="0"/>
+              <a:t> database.</a:t>
+            </a:r>
+          </a:p>
+        </p:txBody>
+      </p:sp>
+    </p:spTree>
+    <p:extLst>
+      <p:ext uri="{BB962C8B-B14F-4D97-AF65-F5344CB8AC3E}">
+        <p14:creationId xmlns:p14="http://schemas.microsoft.com/office/powerpoint/2010/main" val="2662150799"/>
+      </p:ext>
+    </p:extLst>
+  </p:cSld>
+  <p:clrMapOvr>
+    <a:masterClrMapping/>
+  </p:clrMapOvr>
+</p:sld>
+</file>
+
+<file path=ppt/slides/slide12.xml><?xml version="1.0" encoding="utf-8"?>
+<p:sld xmlns:a="http://schemas.openxmlformats.org/drawingml/2006/main" xmlns:r="http://schemas.openxmlformats.org/officeDocument/2006/relationships" xmlns:p="http://schemas.openxmlformats.org/presentationml/2006/main">
+  <p:cSld>
+    <p:spTree>
+      <p:nvGrpSpPr>
+        <p:cNvPr id="1" name=""/>
+        <p:cNvGrpSpPr/>
+        <p:nvPr/>
+      </p:nvGrpSpPr>
+      <p:grpSpPr>
+        <a:xfrm>
+          <a:off x="0" y="0"/>
+          <a:ext cx="0" cy="0"/>
+          <a:chOff x="0" y="0"/>
+          <a:chExt cx="0" cy="0"/>
+        </a:xfrm>
+      </p:grpSpPr>
+      <p:sp>
+        <p:nvSpPr>
+          <p:cNvPr id="2" name="Title 1">
+            <a:extLst>
+              <a:ext uri="{FF2B5EF4-FFF2-40B4-BE49-F238E27FC236}">
+                <a16:creationId xmlns:a16="http://schemas.microsoft.com/office/drawing/2014/main" id="{E32021F1-307B-408C-9FCF-6F677B44ECFE}"/>
+              </a:ext>
+            </a:extLst>
+          </p:cNvPr>
+          <p:cNvSpPr>
+            <a:spLocks noGrp="1"/>
+          </p:cNvSpPr>
+          <p:nvPr>
+            <p:ph type="title"/>
+          </p:nvPr>
+        </p:nvSpPr>
+        <p:spPr/>
+        <p:txBody>
+          <a:bodyPr anchor="ctr">
+            <a:normAutofit/>
+          </a:bodyPr>
+          <a:lstStyle/>
+          <a:p>
+            <a:r>
               <a:rPr lang="en-SG" dirty="0"/>
               <a:t>CRSP/</a:t>
             </a:r>
@@ -4053,7 +4312,7 @@
 </p:sld>
 </file>
 
-<file path=ppt/slides/slide11.xml><?xml version="1.0" encoding="utf-8"?>
+<file path=ppt/slides/slide13.xml><?xml version="1.0" encoding="utf-8"?>
 <p:sld xmlns:a="http://schemas.openxmlformats.org/drawingml/2006/main" xmlns:r="http://schemas.openxmlformats.org/officeDocument/2006/relationships" xmlns:p="http://schemas.openxmlformats.org/presentationml/2006/main">
   <p:cSld>
     <p:spTree>
@@ -7154,7 +7413,7 @@
 </p:sld>
 </file>
 
-<file path=ppt/slides/slide12.xml><?xml version="1.0" encoding="utf-8"?>
+<file path=ppt/slides/slide14.xml><?xml version="1.0" encoding="utf-8"?>
 <p:sld xmlns:a="http://schemas.openxmlformats.org/drawingml/2006/main" xmlns:r="http://schemas.openxmlformats.org/officeDocument/2006/relationships" xmlns:p="http://schemas.openxmlformats.org/presentationml/2006/main">
   <p:cSld>
     <p:spTree>
@@ -7268,7 +7527,7 @@
 </p:sld>
 </file>
 
-<file path=ppt/slides/slide13.xml><?xml version="1.0" encoding="utf-8"?>
+<file path=ppt/slides/slide15.xml><?xml version="1.0" encoding="utf-8"?>
 <p:sld xmlns:a="http://schemas.openxmlformats.org/drawingml/2006/main" xmlns:r="http://schemas.openxmlformats.org/officeDocument/2006/relationships" xmlns:p="http://schemas.openxmlformats.org/presentationml/2006/main">
   <p:cSld>
     <p:spTree>
@@ -7384,7 +7643,7 @@
 </p:sld>
 </file>
 
-<file path=ppt/slides/slide14.xml><?xml version="1.0" encoding="utf-8"?>
+<file path=ppt/slides/slide16.xml><?xml version="1.0" encoding="utf-8"?>
 <p:sld xmlns:a="http://schemas.openxmlformats.org/drawingml/2006/main" xmlns:r="http://schemas.openxmlformats.org/officeDocument/2006/relationships" xmlns:p="http://schemas.openxmlformats.org/presentationml/2006/main">
   <p:cSld>
     <p:spTree>
@@ -7962,7 +8221,7 @@
 </p:sld>
 </file>
 
-<file path=ppt/slides/slide15.xml><?xml version="1.0" encoding="utf-8"?>
+<file path=ppt/slides/slide17.xml><?xml version="1.0" encoding="utf-8"?>
 <p:sld xmlns:a="http://schemas.openxmlformats.org/drawingml/2006/main" xmlns:r="http://schemas.openxmlformats.org/officeDocument/2006/relationships" xmlns:p="http://schemas.openxmlformats.org/presentationml/2006/main">
   <p:cSld>
     <p:spTree>
@@ -8184,7 +8443,7 @@
 </p:sld>
 </file>
 
-<file path=ppt/slides/slide16.xml><?xml version="1.0" encoding="utf-8"?>
+<file path=ppt/slides/slide18.xml><?xml version="1.0" encoding="utf-8"?>
 <p:sld xmlns:a="http://schemas.openxmlformats.org/drawingml/2006/main" xmlns:r="http://schemas.openxmlformats.org/officeDocument/2006/relationships" xmlns:p="http://schemas.openxmlformats.org/presentationml/2006/main">
   <p:cSld>
     <p:spTree>
@@ -8415,7 +8674,7 @@
 </p:sld>
 </file>
 
-<file path=ppt/slides/slide17.xml><?xml version="1.0" encoding="utf-8"?>
+<file path=ppt/slides/slide19.xml><?xml version="1.0" encoding="utf-8"?>
 <p:sld xmlns:a="http://schemas.openxmlformats.org/drawingml/2006/main" xmlns:r="http://schemas.openxmlformats.org/officeDocument/2006/relationships" xmlns:p="http://schemas.openxmlformats.org/presentationml/2006/main">
   <p:cSld>
     <p:spTree>
@@ -8540,7 +8799,73 @@
 </p:sld>
 </file>
 
-<file path=ppt/slides/slide18.xml><?xml version="1.0" encoding="utf-8"?>
+<file path=ppt/slides/slide2.xml><?xml version="1.0" encoding="utf-8"?>
+<p:sld xmlns:a="http://schemas.openxmlformats.org/drawingml/2006/main" xmlns:r="http://schemas.openxmlformats.org/officeDocument/2006/relationships" xmlns:p="http://schemas.openxmlformats.org/presentationml/2006/main">
+  <p:cSld>
+    <p:spTree>
+      <p:nvGrpSpPr>
+        <p:cNvPr id="1" name=""/>
+        <p:cNvGrpSpPr/>
+        <p:nvPr/>
+      </p:nvGrpSpPr>
+      <p:grpSpPr>
+        <a:xfrm>
+          <a:off x="0" y="0"/>
+          <a:ext cx="0" cy="0"/>
+          <a:chOff x="0" y="0"/>
+          <a:chExt cx="0" cy="0"/>
+        </a:xfrm>
+      </p:grpSpPr>
+      <p:sp>
+        <p:nvSpPr>
+          <p:cNvPr id="2" name="Title 1">
+            <a:extLst>
+              <a:ext uri="{FF2B5EF4-FFF2-40B4-BE49-F238E27FC236}">
+                <a16:creationId xmlns:a16="http://schemas.microsoft.com/office/drawing/2014/main" id="{E32021F1-307B-408C-9FCF-6F677B44ECFE}"/>
+              </a:ext>
+            </a:extLst>
+          </p:cNvPr>
+          <p:cNvSpPr>
+            <a:spLocks noGrp="1"/>
+          </p:cNvSpPr>
+          <p:nvPr>
+            <p:ph type="ctrTitle"/>
+          </p:nvPr>
+        </p:nvSpPr>
+        <p:spPr>
+          <a:xfrm>
+            <a:off x="1748344" y="3048113"/>
+            <a:ext cx="8695313" cy="1091974"/>
+          </a:xfrm>
+        </p:spPr>
+        <p:txBody>
+          <a:bodyPr anchor="ctr">
+            <a:normAutofit/>
+          </a:bodyPr>
+          <a:lstStyle/>
+          <a:p>
+            <a:pPr algn="ctr"/>
+            <a:r>
+              <a:rPr lang="en-SG" sz="6600" u="sng" dirty="0"/>
+              <a:t>Hey!</a:t>
+            </a:r>
+          </a:p>
+        </p:txBody>
+      </p:sp>
+    </p:spTree>
+    <p:extLst>
+      <p:ext uri="{BB962C8B-B14F-4D97-AF65-F5344CB8AC3E}">
+        <p14:creationId xmlns:p14="http://schemas.microsoft.com/office/powerpoint/2010/main" val="1263663840"/>
+      </p:ext>
+    </p:extLst>
+  </p:cSld>
+  <p:clrMapOvr>
+    <a:masterClrMapping/>
+  </p:clrMapOvr>
+</p:sld>
+</file>
+
+<file path=ppt/slides/slide20.xml><?xml version="1.0" encoding="utf-8"?>
 <p:sld xmlns:a="http://schemas.openxmlformats.org/drawingml/2006/main" xmlns:r="http://schemas.openxmlformats.org/officeDocument/2006/relationships" xmlns:p="http://schemas.openxmlformats.org/presentationml/2006/main">
   <p:cSld>
     <p:spTree>
@@ -8696,7 +9021,7 @@
 </p:sld>
 </file>
 
-<file path=ppt/slides/slide19.xml><?xml version="1.0" encoding="utf-8"?>
+<file path=ppt/slides/slide21.xml><?xml version="1.0" encoding="utf-8"?>
 <p:sld xmlns:a="http://schemas.openxmlformats.org/drawingml/2006/main" xmlns:r="http://schemas.openxmlformats.org/officeDocument/2006/relationships" xmlns:p="http://schemas.openxmlformats.org/presentationml/2006/main">
   <p:cSld>
     <p:spTree>
@@ -8868,146 +9193,7 @@
 </p:sld>
 </file>
 
-<file path=ppt/slides/slide2.xml><?xml version="1.0" encoding="utf-8"?>
-<p:sld xmlns:a="http://schemas.openxmlformats.org/drawingml/2006/main" xmlns:r="http://schemas.openxmlformats.org/officeDocument/2006/relationships" xmlns:p="http://schemas.openxmlformats.org/presentationml/2006/main">
-  <p:cSld>
-    <p:spTree>
-      <p:nvGrpSpPr>
-        <p:cNvPr id="1" name=""/>
-        <p:cNvGrpSpPr/>
-        <p:nvPr/>
-      </p:nvGrpSpPr>
-      <p:grpSpPr>
-        <a:xfrm>
-          <a:off x="0" y="0"/>
-          <a:ext cx="0" cy="0"/>
-          <a:chOff x="0" y="0"/>
-          <a:chExt cx="0" cy="0"/>
-        </a:xfrm>
-      </p:grpSpPr>
-      <p:sp>
-        <p:nvSpPr>
-          <p:cNvPr id="2" name="Title 1">
-            <a:extLst>
-              <a:ext uri="{FF2B5EF4-FFF2-40B4-BE49-F238E27FC236}">
-                <a16:creationId xmlns:a16="http://schemas.microsoft.com/office/drawing/2014/main" id="{C2531DA1-3254-4DBC-A712-404AF6164653}"/>
-              </a:ext>
-            </a:extLst>
-          </p:cNvPr>
-          <p:cNvSpPr>
-            <a:spLocks noGrp="1"/>
-          </p:cNvSpPr>
-          <p:nvPr>
-            <p:ph type="title"/>
-          </p:nvPr>
-        </p:nvSpPr>
-        <p:spPr/>
-        <p:txBody>
-          <a:bodyPr anchor="ctr">
-            <a:normAutofit/>
-          </a:bodyPr>
-          <a:lstStyle/>
-          <a:p>
-            <a:r>
-              <a:rPr lang="en-SG" dirty="0"/>
-              <a:t>The Dow Jones Utility Average </a:t>
-            </a:r>
-            <a:br>
-              <a:rPr lang="en-SG" dirty="0"/>
-            </a:br>
-            <a:r>
-              <a:rPr lang="en-SG" dirty="0"/>
-              <a:t>&amp; Smart Beta Alternatives</a:t>
-            </a:r>
-          </a:p>
-        </p:txBody>
-      </p:sp>
-      <p:sp>
-        <p:nvSpPr>
-          <p:cNvPr id="3" name="Content Placeholder 2">
-            <a:extLst>
-              <a:ext uri="{FF2B5EF4-FFF2-40B4-BE49-F238E27FC236}">
-                <a16:creationId xmlns:a16="http://schemas.microsoft.com/office/drawing/2014/main" id="{B80800DE-245A-4A7D-94B6-6763B13ED1F5}"/>
-              </a:ext>
-            </a:extLst>
-          </p:cNvPr>
-          <p:cNvSpPr>
-            <a:spLocks noGrp="1"/>
-          </p:cNvSpPr>
-          <p:nvPr>
-            <p:ph idx="1"/>
-          </p:nvPr>
-        </p:nvSpPr>
-        <p:spPr/>
-        <p:txBody>
-          <a:bodyPr anchor="ctr"/>
-          <a:lstStyle/>
-          <a:p>
-            <a:pPr marL="342900" indent="-342900">
-              <a:buFont typeface="+mj-lt"/>
-              <a:buAutoNum type="arabicParenR"/>
-            </a:pPr>
-            <a:r>
-              <a:rPr lang="en-US" dirty="0"/>
-              <a:t>Introduction</a:t>
-            </a:r>
-          </a:p>
-          <a:p>
-            <a:pPr marL="342900" indent="-342900">
-              <a:buFont typeface="+mj-lt"/>
-              <a:buAutoNum type="arabicParenR"/>
-            </a:pPr>
-            <a:r>
-              <a:rPr lang="en-US" dirty="0"/>
-              <a:t>Data Sources &amp; Preparation</a:t>
-            </a:r>
-          </a:p>
-          <a:p>
-            <a:pPr marL="342900" indent="-342900">
-              <a:buFont typeface="+mj-lt"/>
-              <a:buAutoNum type="arabicParenR"/>
-            </a:pPr>
-            <a:r>
-              <a:rPr lang="en-GB" dirty="0"/>
-              <a:t>Smart Beta Index Construction, Methodology &amp; Initial Findings</a:t>
-            </a:r>
-          </a:p>
-          <a:p>
-            <a:pPr marL="342900" indent="-342900">
-              <a:buFont typeface="+mj-lt"/>
-              <a:buAutoNum type="arabicParenR"/>
-            </a:pPr>
-            <a:r>
-              <a:rPr lang="en-GB" dirty="0"/>
-              <a:t>Index Performance Appraisal</a:t>
-            </a:r>
-          </a:p>
-          <a:p>
-            <a:pPr marL="342900" indent="-342900">
-              <a:buFont typeface="+mj-lt"/>
-              <a:buAutoNum type="arabicParenR"/>
-            </a:pPr>
-            <a:r>
-              <a:rPr lang="en-GB" dirty="0"/>
-              <a:t>Conclusion</a:t>
-            </a:r>
-          </a:p>
-        </p:txBody>
-      </p:sp>
-    </p:spTree>
-    <p:extLst>
-      <p:ext uri="{BB962C8B-B14F-4D97-AF65-F5344CB8AC3E}">
-        <p14:creationId xmlns:p14="http://schemas.microsoft.com/office/powerpoint/2010/main" val="1278586762"/>
-      </p:ext>
-    </p:extLst>
-  </p:cSld>
-  <p:clrMapOvr>
-    <a:masterClrMapping/>
-  </p:clrMapOvr>
-</p:sld>
-</file>
-
-<file path=ppt/slides/slide20.xml><?xml version="1.0" encoding="utf-8"?>
+<file path=ppt/slides/slide22.xml><?xml version="1.0" encoding="utf-8"?>
 <p:sld xmlns:a="http://schemas.openxmlformats.org/drawingml/2006/main" xmlns:r="http://schemas.openxmlformats.org/officeDocument/2006/relationships" xmlns:p="http://schemas.openxmlformats.org/presentationml/2006/main">
   <p:cSld>
     <p:spTree>
@@ -9172,7 +9358,7 @@
 </p:sld>
 </file>
 
-<file path=ppt/slides/slide21.xml><?xml version="1.0" encoding="utf-8"?>
+<file path=ppt/slides/slide23.xml><?xml version="1.0" encoding="utf-8"?>
 <p:sld xmlns:a="http://schemas.openxmlformats.org/drawingml/2006/main" xmlns:r="http://schemas.openxmlformats.org/officeDocument/2006/relationships" xmlns:p="http://schemas.openxmlformats.org/presentationml/2006/main">
   <p:cSld>
     <p:spTree>
@@ -9343,7 +9529,7 @@
 </p:sld>
 </file>
 
-<file path=ppt/slides/slide22.xml><?xml version="1.0" encoding="utf-8"?>
+<file path=ppt/slides/slide24.xml><?xml version="1.0" encoding="utf-8"?>
 <p:sld xmlns:a="http://schemas.openxmlformats.org/drawingml/2006/main" xmlns:r="http://schemas.openxmlformats.org/officeDocument/2006/relationships" xmlns:p="http://schemas.openxmlformats.org/presentationml/2006/main">
   <p:cSld>
     <p:spTree>
@@ -9497,7 +9683,7 @@
 </p:sld>
 </file>
 
-<file path=ppt/slides/slide23.xml><?xml version="1.0" encoding="utf-8"?>
+<file path=ppt/slides/slide25.xml><?xml version="1.0" encoding="utf-8"?>
 <p:sld xmlns:a="http://schemas.openxmlformats.org/drawingml/2006/main" xmlns:r="http://schemas.openxmlformats.org/officeDocument/2006/relationships" xmlns:p="http://schemas.openxmlformats.org/presentationml/2006/main">
   <p:cSld>
     <p:spTree>
@@ -9651,7 +9837,7 @@
 </p:sld>
 </file>
 
-<file path=ppt/slides/slide24.xml><?xml version="1.0" encoding="utf-8"?>
+<file path=ppt/slides/slide26.xml><?xml version="1.0" encoding="utf-8"?>
 <p:sld xmlns:a="http://schemas.openxmlformats.org/drawingml/2006/main" xmlns:r="http://schemas.openxmlformats.org/officeDocument/2006/relationships" xmlns:p="http://schemas.openxmlformats.org/presentationml/2006/main">
   <p:cSld>
     <p:spTree>
@@ -9767,7 +9953,7 @@
 </p:sld>
 </file>
 
-<file path=ppt/slides/slide25.xml><?xml version="1.0" encoding="utf-8"?>
+<file path=ppt/slides/slide27.xml><?xml version="1.0" encoding="utf-8"?>
 <p:sld xmlns:a="http://schemas.openxmlformats.org/drawingml/2006/main" xmlns:r="http://schemas.openxmlformats.org/officeDocument/2006/relationships" xmlns:p="http://schemas.openxmlformats.org/presentationml/2006/main">
   <p:cSld>
     <p:spTree>
@@ -13510,7 +13696,7 @@
 </p:sld>
 </file>
 
-<file path=ppt/slides/slide26.xml><?xml version="1.0" encoding="utf-8"?>
+<file path=ppt/slides/slide28.xml><?xml version="1.0" encoding="utf-8"?>
 <p:sld xmlns:a="http://schemas.openxmlformats.org/drawingml/2006/main" xmlns:r="http://schemas.openxmlformats.org/officeDocument/2006/relationships" xmlns:p="http://schemas.openxmlformats.org/presentationml/2006/main">
   <p:cSld>
     <p:spTree>
@@ -17309,7 +17495,7 @@
 </p:sld>
 </file>
 
-<file path=ppt/slides/slide27.xml><?xml version="1.0" encoding="utf-8"?>
+<file path=ppt/slides/slide29.xml><?xml version="1.0" encoding="utf-8"?>
 <p:sld xmlns:a="http://schemas.openxmlformats.org/drawingml/2006/main" xmlns:r="http://schemas.openxmlformats.org/officeDocument/2006/relationships" xmlns:p="http://schemas.openxmlformats.org/presentationml/2006/main">
   <p:cSld>
     <p:spTree>
@@ -22861,7 +23047,73 @@
 </p:sld>
 </file>
 
-<file path=ppt/slides/slide28.xml><?xml version="1.0" encoding="utf-8"?>
+<file path=ppt/slides/slide3.xml><?xml version="1.0" encoding="utf-8"?>
+<p:sld xmlns:a="http://schemas.openxmlformats.org/drawingml/2006/main" xmlns:r="http://schemas.openxmlformats.org/officeDocument/2006/relationships" xmlns:p="http://schemas.openxmlformats.org/presentationml/2006/main">
+  <p:cSld>
+    <p:spTree>
+      <p:nvGrpSpPr>
+        <p:cNvPr id="1" name=""/>
+        <p:cNvGrpSpPr/>
+        <p:nvPr/>
+      </p:nvGrpSpPr>
+      <p:grpSpPr>
+        <a:xfrm>
+          <a:off x="0" y="0"/>
+          <a:ext cx="0" cy="0"/>
+          <a:chOff x="0" y="0"/>
+          <a:chExt cx="0" cy="0"/>
+        </a:xfrm>
+      </p:grpSpPr>
+      <p:sp>
+        <p:nvSpPr>
+          <p:cNvPr id="2" name="Title 1">
+            <a:extLst>
+              <a:ext uri="{FF2B5EF4-FFF2-40B4-BE49-F238E27FC236}">
+                <a16:creationId xmlns:a16="http://schemas.microsoft.com/office/drawing/2014/main" id="{E32021F1-307B-408C-9FCF-6F677B44ECFE}"/>
+              </a:ext>
+            </a:extLst>
+          </p:cNvPr>
+          <p:cNvSpPr>
+            <a:spLocks noGrp="1"/>
+          </p:cNvSpPr>
+          <p:nvPr>
+            <p:ph type="ctrTitle"/>
+          </p:nvPr>
+        </p:nvSpPr>
+        <p:spPr>
+          <a:xfrm>
+            <a:off x="1748344" y="3048113"/>
+            <a:ext cx="8695313" cy="1091974"/>
+          </a:xfrm>
+        </p:spPr>
+        <p:txBody>
+          <a:bodyPr anchor="ctr">
+            <a:normAutofit/>
+          </a:bodyPr>
+          <a:lstStyle/>
+          <a:p>
+            <a:pPr algn="ctr"/>
+            <a:r>
+              <a:rPr lang="en-SG" sz="6600" u="sng" dirty="0"/>
+              <a:t>Enjoy the Chocolates!</a:t>
+            </a:r>
+          </a:p>
+        </p:txBody>
+      </p:sp>
+    </p:spTree>
+    <p:extLst>
+      <p:ext uri="{BB962C8B-B14F-4D97-AF65-F5344CB8AC3E}">
+        <p14:creationId xmlns:p14="http://schemas.microsoft.com/office/powerpoint/2010/main" val="991016143"/>
+      </p:ext>
+    </p:extLst>
+  </p:cSld>
+  <p:clrMapOvr>
+    <a:masterClrMapping/>
+  </p:clrMapOvr>
+</p:sld>
+</file>
+
+<file path=ppt/slides/slide30.xml><?xml version="1.0" encoding="utf-8"?>
 <p:sld xmlns:a="http://schemas.openxmlformats.org/drawingml/2006/main" xmlns:r="http://schemas.openxmlformats.org/officeDocument/2006/relationships" xmlns:p="http://schemas.openxmlformats.org/presentationml/2006/main">
   <p:cSld>
     <p:spTree>
@@ -22893,7 +23145,7 @@
           <p:nvPr>
             <p:extLst>
               <p:ext uri="{D42A27DB-BD31-4B8C-83A1-F6EECF244321}">
-                <p14:modId xmlns:p14="http://schemas.microsoft.com/office/powerpoint/2010/main" val="2273406889"/>
+                <p14:modId xmlns:p14="http://schemas.microsoft.com/office/powerpoint/2010/main" val="2265103867"/>
               </p:ext>
             </p:extLst>
           </p:nvPr>
@@ -23709,7 +23961,7 @@
                           <a:effectLst/>
                           <a:latin typeface="Century Schoolbook" panose="02040604050505020304" pitchFamily="18" charset="0"/>
                         </a:rPr>
-                        <a:t>DJUAPR</a:t>
+                        <a:t>DJUATR</a:t>
                       </a:r>
                     </a:p>
                   </a:txBody>
@@ -27444,7 +27696,7 @@
 </p:sld>
 </file>
 
-<file path=ppt/slides/slide29.xml><?xml version="1.0" encoding="utf-8"?>
+<file path=ppt/slides/slide31.xml><?xml version="1.0" encoding="utf-8"?>
 <p:sld xmlns:a="http://schemas.openxmlformats.org/drawingml/2006/main" xmlns:r="http://schemas.openxmlformats.org/officeDocument/2006/relationships" xmlns:p="http://schemas.openxmlformats.org/presentationml/2006/main">
   <p:cSld>
     <p:spTree>
@@ -27476,7 +27728,7 @@
           <p:nvPr>
             <p:extLst>
               <p:ext uri="{D42A27DB-BD31-4B8C-83A1-F6EECF244321}">
-                <p14:modId xmlns:p14="http://schemas.microsoft.com/office/powerpoint/2010/main" val="1077916956"/>
+                <p14:modId xmlns:p14="http://schemas.microsoft.com/office/powerpoint/2010/main" val="3805316520"/>
               </p:ext>
             </p:extLst>
           </p:nvPr>
@@ -28085,7 +28337,7 @@
                           <a:effectLst/>
                           <a:latin typeface="Century Schoolbook" panose="02040604050505020304" pitchFamily="18" charset="0"/>
                         </a:rPr>
-                        <a:t>DJUAPR</a:t>
+                        <a:t>DJUATR</a:t>
                       </a:r>
                     </a:p>
                   </a:txBody>
@@ -31286,123 +31538,7 @@
 </p:sld>
 </file>
 
-<file path=ppt/slides/slide3.xml><?xml version="1.0" encoding="utf-8"?>
-<p:sld xmlns:a="http://schemas.openxmlformats.org/drawingml/2006/main" xmlns:r="http://schemas.openxmlformats.org/officeDocument/2006/relationships" xmlns:p="http://schemas.openxmlformats.org/presentationml/2006/main">
-  <p:cSld>
-    <p:spTree>
-      <p:nvGrpSpPr>
-        <p:cNvPr id="1" name=""/>
-        <p:cNvGrpSpPr/>
-        <p:nvPr/>
-      </p:nvGrpSpPr>
-      <p:grpSpPr>
-        <a:xfrm>
-          <a:off x="0" y="0"/>
-          <a:ext cx="0" cy="0"/>
-          <a:chOff x="0" y="0"/>
-          <a:chExt cx="0" cy="0"/>
-        </a:xfrm>
-      </p:grpSpPr>
-      <p:sp>
-        <p:nvSpPr>
-          <p:cNvPr id="6" name="TextBox 5">
-            <a:extLst>
-              <a:ext uri="{FF2B5EF4-FFF2-40B4-BE49-F238E27FC236}">
-                <a16:creationId xmlns:a16="http://schemas.microsoft.com/office/drawing/2014/main" id="{D0E58ACE-BDD6-4F97-8AAE-520552BF048D}"/>
-              </a:ext>
-            </a:extLst>
-          </p:cNvPr>
-          <p:cNvSpPr txBox="1"/>
-          <p:nvPr/>
-        </p:nvSpPr>
-        <p:spPr>
-          <a:xfrm>
-            <a:off x="5015020" y="1174537"/>
-            <a:ext cx="2161960" cy="4508927"/>
-          </a:xfrm>
-          <a:prstGeom prst="rect">
-            <a:avLst/>
-          </a:prstGeom>
-          <a:noFill/>
-        </p:spPr>
-        <p:txBody>
-          <a:bodyPr wrap="square" rtlCol="0">
-            <a:spAutoFit/>
-          </a:bodyPr>
-          <a:lstStyle/>
-          <a:p>
-            <a:r>
-              <a:rPr lang="en-US" sz="28700" b="1" dirty="0">
-                <a:solidFill>
-                  <a:schemeClr val="bg1">
-                    <a:lumMod val="50000"/>
-                    <a:lumOff val="50000"/>
-                  </a:schemeClr>
-                </a:solidFill>
-              </a:rPr>
-              <a:t>1</a:t>
-            </a:r>
-            <a:endParaRPr lang="en-GB" sz="28700" b="1" dirty="0">
-              <a:solidFill>
-                <a:schemeClr val="bg1">
-                  <a:lumMod val="50000"/>
-                  <a:lumOff val="50000"/>
-                </a:schemeClr>
-              </a:solidFill>
-            </a:endParaRPr>
-          </a:p>
-        </p:txBody>
-      </p:sp>
-      <p:sp>
-        <p:nvSpPr>
-          <p:cNvPr id="2" name="Title 1">
-            <a:extLst>
-              <a:ext uri="{FF2B5EF4-FFF2-40B4-BE49-F238E27FC236}">
-                <a16:creationId xmlns:a16="http://schemas.microsoft.com/office/drawing/2014/main" id="{E32021F1-307B-408C-9FCF-6F677B44ECFE}"/>
-              </a:ext>
-            </a:extLst>
-          </p:cNvPr>
-          <p:cNvSpPr>
-            <a:spLocks noGrp="1"/>
-          </p:cNvSpPr>
-          <p:nvPr>
-            <p:ph type="ctrTitle"/>
-          </p:nvPr>
-        </p:nvSpPr>
-        <p:spPr>
-          <a:xfrm>
-            <a:off x="1748344" y="3048113"/>
-            <a:ext cx="8695313" cy="1091974"/>
-          </a:xfrm>
-        </p:spPr>
-        <p:txBody>
-          <a:bodyPr anchor="ctr">
-            <a:normAutofit/>
-          </a:bodyPr>
-          <a:lstStyle/>
-          <a:p>
-            <a:pPr algn="ctr"/>
-            <a:r>
-              <a:rPr lang="en-SG" sz="6600" u="sng" dirty="0"/>
-              <a:t>Introduction</a:t>
-            </a:r>
-          </a:p>
-        </p:txBody>
-      </p:sp>
-    </p:spTree>
-    <p:extLst>
-      <p:ext uri="{BB962C8B-B14F-4D97-AF65-F5344CB8AC3E}">
-        <p14:creationId xmlns:p14="http://schemas.microsoft.com/office/powerpoint/2010/main" val="1087048396"/>
-      </p:ext>
-    </p:extLst>
-  </p:cSld>
-  <p:clrMapOvr>
-    <a:masterClrMapping/>
-  </p:clrMapOvr>
-</p:sld>
-</file>
-
-<file path=ppt/slides/slide30.xml><?xml version="1.0" encoding="utf-8"?>
+<file path=ppt/slides/slide32.xml><?xml version="1.0" encoding="utf-8"?>
 <p:sld xmlns:a="http://schemas.openxmlformats.org/drawingml/2006/main" xmlns:r="http://schemas.openxmlformats.org/officeDocument/2006/relationships" xmlns:p="http://schemas.openxmlformats.org/presentationml/2006/main">
   <p:cSld>
     <p:spTree>
@@ -37674,7 +37810,7 @@
 </p:sld>
 </file>
 
-<file path=ppt/slides/slide31.xml><?xml version="1.0" encoding="utf-8"?>
+<file path=ppt/slides/slide33.xml><?xml version="1.0" encoding="utf-8"?>
 <p:sld xmlns:a="http://schemas.openxmlformats.org/drawingml/2006/main" xmlns:r="http://schemas.openxmlformats.org/officeDocument/2006/relationships" xmlns:p="http://schemas.openxmlformats.org/presentationml/2006/main">
   <p:cSld>
     <p:spTree>
@@ -37790,7 +37926,7 @@
 </p:sld>
 </file>
 
-<file path=ppt/slides/slide32.xml><?xml version="1.0" encoding="utf-8"?>
+<file path=ppt/slides/slide34.xml><?xml version="1.0" encoding="utf-8"?>
 <p:sld xmlns:a="http://schemas.openxmlformats.org/drawingml/2006/main" xmlns:r="http://schemas.openxmlformats.org/officeDocument/2006/relationships" xmlns:p="http://schemas.openxmlformats.org/presentationml/2006/main">
   <p:cSld>
     <p:spTree>
@@ -37960,7 +38096,7 @@
 </p:sld>
 </file>
 
-<file path=ppt/slides/slide33.xml><?xml version="1.0" encoding="utf-8"?>
+<file path=ppt/slides/slide35.xml><?xml version="1.0" encoding="utf-8"?>
 <p:sld xmlns:a="http://schemas.openxmlformats.org/drawingml/2006/main" xmlns:r="http://schemas.openxmlformats.org/officeDocument/2006/relationships" xmlns:p="http://schemas.openxmlformats.org/presentationml/2006/main">
   <p:cSld>
     <p:spTree>
@@ -38027,6 +38163,261 @@
 </file>
 
 <file path=ppt/slides/slide4.xml><?xml version="1.0" encoding="utf-8"?>
+<p:sld xmlns:a="http://schemas.openxmlformats.org/drawingml/2006/main" xmlns:r="http://schemas.openxmlformats.org/officeDocument/2006/relationships" xmlns:p="http://schemas.openxmlformats.org/presentationml/2006/main">
+  <p:cSld>
+    <p:spTree>
+      <p:nvGrpSpPr>
+        <p:cNvPr id="1" name=""/>
+        <p:cNvGrpSpPr/>
+        <p:nvPr/>
+      </p:nvGrpSpPr>
+      <p:grpSpPr>
+        <a:xfrm>
+          <a:off x="0" y="0"/>
+          <a:ext cx="0" cy="0"/>
+          <a:chOff x="0" y="0"/>
+          <a:chExt cx="0" cy="0"/>
+        </a:xfrm>
+      </p:grpSpPr>
+      <p:sp>
+        <p:nvSpPr>
+          <p:cNvPr id="2" name="Title 1">
+            <a:extLst>
+              <a:ext uri="{FF2B5EF4-FFF2-40B4-BE49-F238E27FC236}">
+                <a16:creationId xmlns:a16="http://schemas.microsoft.com/office/drawing/2014/main" id="{C2531DA1-3254-4DBC-A712-404AF6164653}"/>
+              </a:ext>
+            </a:extLst>
+          </p:cNvPr>
+          <p:cNvSpPr>
+            <a:spLocks noGrp="1"/>
+          </p:cNvSpPr>
+          <p:nvPr>
+            <p:ph type="title"/>
+          </p:nvPr>
+        </p:nvSpPr>
+        <p:spPr/>
+        <p:txBody>
+          <a:bodyPr anchor="ctr">
+            <a:normAutofit/>
+          </a:bodyPr>
+          <a:lstStyle/>
+          <a:p>
+            <a:r>
+              <a:rPr lang="en-SG" dirty="0"/>
+              <a:t>The Dow Jones Utility Average </a:t>
+            </a:r>
+            <a:br>
+              <a:rPr lang="en-SG" dirty="0"/>
+            </a:br>
+            <a:r>
+              <a:rPr lang="en-SG" dirty="0"/>
+              <a:t>&amp; Smart Beta Alternatives</a:t>
+            </a:r>
+          </a:p>
+        </p:txBody>
+      </p:sp>
+      <p:sp>
+        <p:nvSpPr>
+          <p:cNvPr id="3" name="Content Placeholder 2">
+            <a:extLst>
+              <a:ext uri="{FF2B5EF4-FFF2-40B4-BE49-F238E27FC236}">
+                <a16:creationId xmlns:a16="http://schemas.microsoft.com/office/drawing/2014/main" id="{B80800DE-245A-4A7D-94B6-6763B13ED1F5}"/>
+              </a:ext>
+            </a:extLst>
+          </p:cNvPr>
+          <p:cNvSpPr>
+            <a:spLocks noGrp="1"/>
+          </p:cNvSpPr>
+          <p:nvPr>
+            <p:ph idx="1"/>
+          </p:nvPr>
+        </p:nvSpPr>
+        <p:spPr/>
+        <p:txBody>
+          <a:bodyPr anchor="ctr"/>
+          <a:lstStyle/>
+          <a:p>
+            <a:pPr marL="342900" indent="-342900">
+              <a:buFont typeface="+mj-lt"/>
+              <a:buAutoNum type="arabicParenR"/>
+            </a:pPr>
+            <a:r>
+              <a:rPr lang="en-US" dirty="0"/>
+              <a:t>Introduction</a:t>
+            </a:r>
+          </a:p>
+          <a:p>
+            <a:pPr marL="342900" indent="-342900">
+              <a:buFont typeface="+mj-lt"/>
+              <a:buAutoNum type="arabicParenR"/>
+            </a:pPr>
+            <a:r>
+              <a:rPr lang="en-US" dirty="0"/>
+              <a:t>Data Sources &amp; Preparation</a:t>
+            </a:r>
+          </a:p>
+          <a:p>
+            <a:pPr marL="342900" indent="-342900">
+              <a:buFont typeface="+mj-lt"/>
+              <a:buAutoNum type="arabicParenR"/>
+            </a:pPr>
+            <a:r>
+              <a:rPr lang="en-GB" dirty="0"/>
+              <a:t>Smart Beta Index Construction, Methodology &amp; Initial Findings</a:t>
+            </a:r>
+          </a:p>
+          <a:p>
+            <a:pPr marL="342900" indent="-342900">
+              <a:buFont typeface="+mj-lt"/>
+              <a:buAutoNum type="arabicParenR"/>
+            </a:pPr>
+            <a:r>
+              <a:rPr lang="en-GB" dirty="0"/>
+              <a:t>Index Performance Appraisal</a:t>
+            </a:r>
+          </a:p>
+          <a:p>
+            <a:pPr marL="342900" indent="-342900">
+              <a:buFont typeface="+mj-lt"/>
+              <a:buAutoNum type="arabicParenR"/>
+            </a:pPr>
+            <a:r>
+              <a:rPr lang="en-GB" dirty="0"/>
+              <a:t>Conclusion</a:t>
+            </a:r>
+          </a:p>
+        </p:txBody>
+      </p:sp>
+    </p:spTree>
+    <p:extLst>
+      <p:ext uri="{BB962C8B-B14F-4D97-AF65-F5344CB8AC3E}">
+        <p14:creationId xmlns:p14="http://schemas.microsoft.com/office/powerpoint/2010/main" val="1278586762"/>
+      </p:ext>
+    </p:extLst>
+  </p:cSld>
+  <p:clrMapOvr>
+    <a:masterClrMapping/>
+  </p:clrMapOvr>
+</p:sld>
+</file>
+
+<file path=ppt/slides/slide5.xml><?xml version="1.0" encoding="utf-8"?>
+<p:sld xmlns:a="http://schemas.openxmlformats.org/drawingml/2006/main" xmlns:r="http://schemas.openxmlformats.org/officeDocument/2006/relationships" xmlns:p="http://schemas.openxmlformats.org/presentationml/2006/main">
+  <p:cSld>
+    <p:spTree>
+      <p:nvGrpSpPr>
+        <p:cNvPr id="1" name=""/>
+        <p:cNvGrpSpPr/>
+        <p:nvPr/>
+      </p:nvGrpSpPr>
+      <p:grpSpPr>
+        <a:xfrm>
+          <a:off x="0" y="0"/>
+          <a:ext cx="0" cy="0"/>
+          <a:chOff x="0" y="0"/>
+          <a:chExt cx="0" cy="0"/>
+        </a:xfrm>
+      </p:grpSpPr>
+      <p:sp>
+        <p:nvSpPr>
+          <p:cNvPr id="6" name="TextBox 5">
+            <a:extLst>
+              <a:ext uri="{FF2B5EF4-FFF2-40B4-BE49-F238E27FC236}">
+                <a16:creationId xmlns:a16="http://schemas.microsoft.com/office/drawing/2014/main" id="{D0E58ACE-BDD6-4F97-8AAE-520552BF048D}"/>
+              </a:ext>
+            </a:extLst>
+          </p:cNvPr>
+          <p:cNvSpPr txBox="1"/>
+          <p:nvPr/>
+        </p:nvSpPr>
+        <p:spPr>
+          <a:xfrm>
+            <a:off x="5015020" y="1174537"/>
+            <a:ext cx="2161960" cy="4508927"/>
+          </a:xfrm>
+          <a:prstGeom prst="rect">
+            <a:avLst/>
+          </a:prstGeom>
+          <a:noFill/>
+        </p:spPr>
+        <p:txBody>
+          <a:bodyPr wrap="square" rtlCol="0">
+            <a:spAutoFit/>
+          </a:bodyPr>
+          <a:lstStyle/>
+          <a:p>
+            <a:r>
+              <a:rPr lang="en-US" sz="28700" b="1" dirty="0">
+                <a:solidFill>
+                  <a:schemeClr val="bg1">
+                    <a:lumMod val="50000"/>
+                    <a:lumOff val="50000"/>
+                  </a:schemeClr>
+                </a:solidFill>
+              </a:rPr>
+              <a:t>1</a:t>
+            </a:r>
+            <a:endParaRPr lang="en-GB" sz="28700" b="1" dirty="0">
+              <a:solidFill>
+                <a:schemeClr val="bg1">
+                  <a:lumMod val="50000"/>
+                  <a:lumOff val="50000"/>
+                </a:schemeClr>
+              </a:solidFill>
+            </a:endParaRPr>
+          </a:p>
+        </p:txBody>
+      </p:sp>
+      <p:sp>
+        <p:nvSpPr>
+          <p:cNvPr id="2" name="Title 1">
+            <a:extLst>
+              <a:ext uri="{FF2B5EF4-FFF2-40B4-BE49-F238E27FC236}">
+                <a16:creationId xmlns:a16="http://schemas.microsoft.com/office/drawing/2014/main" id="{E32021F1-307B-408C-9FCF-6F677B44ECFE}"/>
+              </a:ext>
+            </a:extLst>
+          </p:cNvPr>
+          <p:cNvSpPr>
+            <a:spLocks noGrp="1"/>
+          </p:cNvSpPr>
+          <p:nvPr>
+            <p:ph type="ctrTitle"/>
+          </p:nvPr>
+        </p:nvSpPr>
+        <p:spPr>
+          <a:xfrm>
+            <a:off x="1748344" y="3048113"/>
+            <a:ext cx="8695313" cy="1091974"/>
+          </a:xfrm>
+        </p:spPr>
+        <p:txBody>
+          <a:bodyPr anchor="ctr">
+            <a:normAutofit/>
+          </a:bodyPr>
+          <a:lstStyle/>
+          <a:p>
+            <a:pPr algn="ctr"/>
+            <a:r>
+              <a:rPr lang="en-SG" sz="6600" u="sng" dirty="0"/>
+              <a:t>Introduction</a:t>
+            </a:r>
+          </a:p>
+        </p:txBody>
+      </p:sp>
+    </p:spTree>
+    <p:extLst>
+      <p:ext uri="{BB962C8B-B14F-4D97-AF65-F5344CB8AC3E}">
+        <p14:creationId xmlns:p14="http://schemas.microsoft.com/office/powerpoint/2010/main" val="1087048396"/>
+      </p:ext>
+    </p:extLst>
+  </p:cSld>
+  <p:clrMapOvr>
+    <a:masterClrMapping/>
+  </p:clrMapOvr>
+</p:sld>
+</file>
+
+<file path=ppt/slides/slide6.xml><?xml version="1.0" encoding="utf-8"?>
 <p:sld xmlns:a="http://schemas.openxmlformats.org/drawingml/2006/main" xmlns:r="http://schemas.openxmlformats.org/officeDocument/2006/relationships" xmlns:p="http://schemas.openxmlformats.org/presentationml/2006/main">
   <p:cSld>
     <p:spTree>
@@ -38147,7 +38538,7 @@
 </p:sld>
 </file>
 
-<file path=ppt/slides/slide5.xml><?xml version="1.0" encoding="utf-8"?>
+<file path=ppt/slides/slide7.xml><?xml version="1.0" encoding="utf-8"?>
 <p:sld xmlns:a="http://schemas.openxmlformats.org/drawingml/2006/main" xmlns:r="http://schemas.openxmlformats.org/officeDocument/2006/relationships" xmlns:p="http://schemas.openxmlformats.org/presentationml/2006/main">
   <p:cSld>
     <p:spTree>
@@ -38284,7 +38675,7 @@
 </p:sld>
 </file>
 
-<file path=ppt/slides/slide6.xml><?xml version="1.0" encoding="utf-8"?>
+<file path=ppt/slides/slide8.xml><?xml version="1.0" encoding="utf-8"?>
 <p:sld xmlns:a="http://schemas.openxmlformats.org/drawingml/2006/main" xmlns:r="http://schemas.openxmlformats.org/officeDocument/2006/relationships" xmlns:p="http://schemas.openxmlformats.org/presentationml/2006/main">
   <p:cSld>
     <p:spTree>
@@ -38400,7 +38791,7 @@
 </p:sld>
 </file>
 
-<file path=ppt/slides/slide7.xml><?xml version="1.0" encoding="utf-8"?>
+<file path=ppt/slides/slide9.xml><?xml version="1.0" encoding="utf-8"?>
 <p:sld xmlns:a="http://schemas.openxmlformats.org/drawingml/2006/main" xmlns:r="http://schemas.openxmlformats.org/officeDocument/2006/relationships" xmlns:p="http://schemas.openxmlformats.org/presentationml/2006/main">
   <p:cSld>
     <p:spTree>
@@ -38546,263 +38937,6 @@
     <p:extLst>
       <p:ext uri="{BB962C8B-B14F-4D97-AF65-F5344CB8AC3E}">
         <p14:creationId xmlns:p14="http://schemas.microsoft.com/office/powerpoint/2010/main" val="3740863440"/>
-      </p:ext>
-    </p:extLst>
-  </p:cSld>
-  <p:clrMapOvr>
-    <a:masterClrMapping/>
-  </p:clrMapOvr>
-</p:sld>
-</file>
-
-<file path=ppt/slides/slide8.xml><?xml version="1.0" encoding="utf-8"?>
-<p:sld xmlns:a="http://schemas.openxmlformats.org/drawingml/2006/main" xmlns:r="http://schemas.openxmlformats.org/officeDocument/2006/relationships" xmlns:p="http://schemas.openxmlformats.org/presentationml/2006/main">
-  <p:cSld>
-    <p:spTree>
-      <p:nvGrpSpPr>
-        <p:cNvPr id="1" name=""/>
-        <p:cNvGrpSpPr/>
-        <p:nvPr/>
-      </p:nvGrpSpPr>
-      <p:grpSpPr>
-        <a:xfrm>
-          <a:off x="0" y="0"/>
-          <a:ext cx="0" cy="0"/>
-          <a:chOff x="0" y="0"/>
-          <a:chExt cx="0" cy="0"/>
-        </a:xfrm>
-      </p:grpSpPr>
-      <p:sp>
-        <p:nvSpPr>
-          <p:cNvPr id="2" name="Title 1">
-            <a:extLst>
-              <a:ext uri="{FF2B5EF4-FFF2-40B4-BE49-F238E27FC236}">
-                <a16:creationId xmlns:a16="http://schemas.microsoft.com/office/drawing/2014/main" id="{E32021F1-307B-408C-9FCF-6F677B44ECFE}"/>
-              </a:ext>
-            </a:extLst>
-          </p:cNvPr>
-          <p:cNvSpPr>
-            <a:spLocks noGrp="1"/>
-          </p:cNvSpPr>
-          <p:nvPr>
-            <p:ph type="title"/>
-          </p:nvPr>
-        </p:nvSpPr>
-        <p:spPr/>
-        <p:txBody>
-          <a:bodyPr anchor="ctr">
-            <a:normAutofit/>
-          </a:bodyPr>
-          <a:lstStyle/>
-          <a:p>
-            <a:r>
-              <a:rPr lang="en-SG" dirty="0" err="1"/>
-              <a:t>Center</a:t>
-            </a:r>
-            <a:r>
-              <a:rPr lang="en-SG" dirty="0"/>
-              <a:t> for Research in Security Prices (CRSP)</a:t>
-            </a:r>
-          </a:p>
-        </p:txBody>
-      </p:sp>
-      <p:sp>
-        <p:nvSpPr>
-          <p:cNvPr id="3" name="Content Placeholder 2">
-            <a:extLst>
-              <a:ext uri="{FF2B5EF4-FFF2-40B4-BE49-F238E27FC236}">
-                <a16:creationId xmlns:a16="http://schemas.microsoft.com/office/drawing/2014/main" id="{C5A6A21D-90D4-4D3D-A603-476DBD3CBF11}"/>
-              </a:ext>
-            </a:extLst>
-          </p:cNvPr>
-          <p:cNvSpPr>
-            <a:spLocks noGrp="1"/>
-          </p:cNvSpPr>
-          <p:nvPr>
-            <p:ph idx="1"/>
-          </p:nvPr>
-        </p:nvSpPr>
-        <p:spPr/>
-        <p:txBody>
-          <a:bodyPr anchor="ctr">
-            <a:normAutofit/>
-          </a:bodyPr>
-          <a:lstStyle/>
-          <a:p>
-            <a:pPr algn="just"/>
-            <a:r>
-              <a:rPr lang="en-SG" dirty="0"/>
-              <a:t>The </a:t>
-            </a:r>
-            <a:r>
-              <a:rPr lang="en-SG" dirty="0" err="1"/>
-              <a:t>Center</a:t>
-            </a:r>
-            <a:r>
-              <a:rPr lang="en-SG" dirty="0"/>
-              <a:t> for Research in Security Prices (CRSP) provided us with relevant data on:</a:t>
-            </a:r>
-          </a:p>
-          <a:p>
-            <a:pPr lvl="1" algn="just"/>
-            <a:r>
-              <a:rPr lang="en-SG" sz="1800" dirty="0"/>
-              <a:t>Monthly closing price, </a:t>
-            </a:r>
-          </a:p>
-          <a:p>
-            <a:pPr lvl="1" algn="just"/>
-            <a:r>
-              <a:rPr lang="en-SG" sz="1800" dirty="0"/>
-              <a:t>Adjusted returns </a:t>
-            </a:r>
-          </a:p>
-          <a:p>
-            <a:pPr lvl="1" algn="just"/>
-            <a:r>
-              <a:rPr lang="en-SG" sz="1800" dirty="0"/>
-              <a:t>Outstanding number of stocks. </a:t>
-            </a:r>
-          </a:p>
-          <a:p>
-            <a:pPr algn="just"/>
-            <a:r>
-              <a:rPr lang="en-SG" b="1" dirty="0"/>
-              <a:t>PERMCOs and PERMNOs </a:t>
-            </a:r>
-            <a:r>
-              <a:rPr lang="en-SG" dirty="0"/>
-              <a:t>as unique entity and issue-level identifiers when navigating the CRSP database.</a:t>
-            </a:r>
-          </a:p>
-        </p:txBody>
-      </p:sp>
-    </p:spTree>
-    <p:extLst>
-      <p:ext uri="{BB962C8B-B14F-4D97-AF65-F5344CB8AC3E}">
-        <p14:creationId xmlns:p14="http://schemas.microsoft.com/office/powerpoint/2010/main" val="1085148044"/>
-      </p:ext>
-    </p:extLst>
-  </p:cSld>
-  <p:clrMapOvr>
-    <a:masterClrMapping/>
-  </p:clrMapOvr>
-</p:sld>
-</file>
-
-<file path=ppt/slides/slide9.xml><?xml version="1.0" encoding="utf-8"?>
-<p:sld xmlns:a="http://schemas.openxmlformats.org/drawingml/2006/main" xmlns:r="http://schemas.openxmlformats.org/officeDocument/2006/relationships" xmlns:p="http://schemas.openxmlformats.org/presentationml/2006/main">
-  <p:cSld>
-    <p:spTree>
-      <p:nvGrpSpPr>
-        <p:cNvPr id="1" name=""/>
-        <p:cNvGrpSpPr/>
-        <p:nvPr/>
-      </p:nvGrpSpPr>
-      <p:grpSpPr>
-        <a:xfrm>
-          <a:off x="0" y="0"/>
-          <a:ext cx="0" cy="0"/>
-          <a:chOff x="0" y="0"/>
-          <a:chExt cx="0" cy="0"/>
-        </a:xfrm>
-      </p:grpSpPr>
-      <p:sp>
-        <p:nvSpPr>
-          <p:cNvPr id="2" name="Title 1">
-            <a:extLst>
-              <a:ext uri="{FF2B5EF4-FFF2-40B4-BE49-F238E27FC236}">
-                <a16:creationId xmlns:a16="http://schemas.microsoft.com/office/drawing/2014/main" id="{E32021F1-307B-408C-9FCF-6F677B44ECFE}"/>
-              </a:ext>
-            </a:extLst>
-          </p:cNvPr>
-          <p:cNvSpPr>
-            <a:spLocks noGrp="1"/>
-          </p:cNvSpPr>
-          <p:nvPr>
-            <p:ph type="title"/>
-          </p:nvPr>
-        </p:nvSpPr>
-        <p:spPr/>
-        <p:txBody>
-          <a:bodyPr anchor="ctr">
-            <a:normAutofit/>
-          </a:bodyPr>
-          <a:lstStyle/>
-          <a:p>
-            <a:r>
-              <a:rPr lang="en-SG" dirty="0" err="1"/>
-              <a:t>Compustat</a:t>
-            </a:r>
-            <a:r>
-              <a:rPr lang="en-SG" dirty="0"/>
-              <a:t> - Capital IQ</a:t>
-            </a:r>
-          </a:p>
-        </p:txBody>
-      </p:sp>
-      <p:sp>
-        <p:nvSpPr>
-          <p:cNvPr id="3" name="Content Placeholder 2">
-            <a:extLst>
-              <a:ext uri="{FF2B5EF4-FFF2-40B4-BE49-F238E27FC236}">
-                <a16:creationId xmlns:a16="http://schemas.microsoft.com/office/drawing/2014/main" id="{C5A6A21D-90D4-4D3D-A603-476DBD3CBF11}"/>
-              </a:ext>
-            </a:extLst>
-          </p:cNvPr>
-          <p:cNvSpPr>
-            <a:spLocks noGrp="1"/>
-          </p:cNvSpPr>
-          <p:nvPr>
-            <p:ph idx="1"/>
-          </p:nvPr>
-        </p:nvSpPr>
-        <p:spPr/>
-        <p:txBody>
-          <a:bodyPr anchor="ctr">
-            <a:normAutofit/>
-          </a:bodyPr>
-          <a:lstStyle/>
-          <a:p>
-            <a:pPr algn="just"/>
-            <a:r>
-              <a:rPr lang="en-SG" dirty="0" err="1"/>
-              <a:t>Compustat</a:t>
-            </a:r>
-            <a:r>
-              <a:rPr lang="en-SG" dirty="0"/>
-              <a:t> provided us with the relevant fundamentals data (e.g. Net Income, Operating Cash Flow etc) on the relevant constituent stocks of the Dow Jones Utility Average. </a:t>
-            </a:r>
-          </a:p>
-          <a:p>
-            <a:pPr algn="just"/>
-            <a:r>
-              <a:rPr lang="en-SG" dirty="0"/>
-              <a:t>We used </a:t>
-            </a:r>
-            <a:r>
-              <a:rPr lang="en-SG" b="1" dirty="0"/>
-              <a:t>GVKEY</a:t>
-            </a:r>
-            <a:r>
-              <a:rPr lang="en-SG" dirty="0"/>
-              <a:t> as unique entity-level identifiers when navigating the </a:t>
-            </a:r>
-            <a:r>
-              <a:rPr lang="en-SG" dirty="0" err="1"/>
-              <a:t>Compustat</a:t>
-            </a:r>
-            <a:r>
-              <a:rPr lang="en-SG" dirty="0"/>
-              <a:t> database.</a:t>
-            </a:r>
-          </a:p>
-        </p:txBody>
-      </p:sp>
-    </p:spTree>
-    <p:extLst>
-      <p:ext uri="{BB962C8B-B14F-4D97-AF65-F5344CB8AC3E}">
-        <p14:creationId xmlns:p14="http://schemas.microsoft.com/office/powerpoint/2010/main" val="2662150799"/>
       </p:ext>
     </p:extLst>
   </p:cSld>

</xml_diff>